<commit_message>
updated slideshare slides and powerpoitn with linkedin info
</commit_message>
<xml_diff>
--- a/Presentations/Postgresql Presentation Day 1.pptx
+++ b/Presentations/Postgresql Presentation Day 1.pptx
@@ -6420,10 +6420,6 @@
               <a:rPr lang="en-US" dirty="0" smtClean="0"/>
               <a:t>Our primary reference works</a:t>
             </a:r>
-            <a:r>
-              <a:rPr lang="en-US" dirty="0" smtClean="0"/>
-              <a:t/>
-            </a:r>
             <a:br>
               <a:rPr lang="en-US" dirty="0" smtClean="0"/>
             </a:br>
@@ -6621,10 +6617,6 @@
               <a:rPr lang="en-US" dirty="0" smtClean="0"/>
               <a:t>Who is Michael Forrester?</a:t>
             </a:r>
-            <a:r>
-              <a:rPr lang="en-US" dirty="0" smtClean="0"/>
-              <a:t/>
-            </a:r>
             <a:br>
               <a:rPr lang="en-US" dirty="0" smtClean="0"/>
             </a:br>
@@ -6655,10 +6647,54 @@
           <a:lstStyle/>
           <a:p>
             <a:pPr fontAlgn="base"/>
+            <a:r>
+              <a:rPr lang="en-US" dirty="0">
+                <a:hlinkClick r:id="rId2"/>
+              </a:rPr>
+              <a:t>https://</a:t>
+            </a:r>
+            <a:r>
+              <a:rPr lang="en-US" dirty="0" smtClean="0">
+                <a:hlinkClick r:id="rId2"/>
+              </a:rPr>
+              <a:t>www.linkedin.com/in/performingpro</a:t>
+            </a:r>
             <a:endParaRPr lang="en-US" dirty="0" smtClean="0"/>
           </a:p>
-        </p:txBody>
-      </p:sp>
+          <a:p>
+            <a:pPr fontAlgn="base"/>
+            <a:endParaRPr lang="en-US" dirty="0"/>
+          </a:p>
+          <a:p>
+            <a:pPr fontAlgn="base"/>
+            <a:endParaRPr lang="en-US" dirty="0" smtClean="0"/>
+          </a:p>
+        </p:txBody>
+      </p:sp>
+      <p:pic>
+        <p:nvPicPr>
+          <p:cNvPr id="4" name="Picture 3"/>
+          <p:cNvPicPr>
+            <a:picLocks noChangeAspect="1"/>
+          </p:cNvPicPr>
+          <p:nvPr/>
+        </p:nvPicPr>
+        <p:blipFill>
+          <a:blip r:embed="rId3"/>
+          <a:stretch>
+            <a:fillRect/>
+          </a:stretch>
+        </p:blipFill>
+        <p:spPr>
+          <a:xfrm>
+            <a:off x="1704588" y="1924392"/>
+            <a:ext cx="6410325" cy="4152900"/>
+          </a:xfrm>
+          <a:prstGeom prst="rect">
+            <a:avLst/>
+          </a:prstGeom>
+        </p:spPr>
+      </p:pic>
     </p:spTree>
     <p:extLst>
       <p:ext uri="{BB962C8B-B14F-4D97-AF65-F5344CB8AC3E}">
@@ -6713,10 +6749,6 @@
               <a:rPr lang="en-US" dirty="0" smtClean="0"/>
               <a:t>Introduction</a:t>
             </a:r>
-            <a:r>
-              <a:rPr lang="en-US" dirty="0" smtClean="0"/>
-              <a:t/>
-            </a:r>
             <a:br>
               <a:rPr lang="en-US" dirty="0" smtClean="0"/>
             </a:br>
@@ -6833,10 +6865,6 @@
               <a:rPr lang="en-US" dirty="0" smtClean="0"/>
               <a:t>What is your project?</a:t>
             </a:r>
-            <a:r>
-              <a:rPr lang="en-US" dirty="0" smtClean="0"/>
-              <a:t/>
-            </a:r>
             <a:br>
               <a:rPr lang="en-US" dirty="0" smtClean="0"/>
             </a:br>
@@ -6871,7 +6899,6 @@
               <a:rPr lang="en-US" dirty="0" smtClean="0"/>
               <a:t>Details, Details, Details.</a:t>
             </a:r>
-            <a:endParaRPr lang="en-US" dirty="0" smtClean="0"/>
           </a:p>
           <a:p>
             <a:pPr fontAlgn="base"/>
@@ -6957,10 +6984,6 @@
               <a:rPr lang="en-US" dirty="0" smtClean="0"/>
               <a:t>Platforms and Sizing</a:t>
             </a:r>
-            <a:r>
-              <a:rPr lang="en-US" dirty="0" smtClean="0"/>
-              <a:t/>
-            </a:r>
             <a:br>
               <a:rPr lang="en-US" dirty="0" smtClean="0"/>
             </a:br>
@@ -7002,7 +7025,6 @@
               <a:rPr lang="en-US" dirty="0" smtClean="0"/>
               <a:t>Let’s talk about what you have now?</a:t>
             </a:r>
-            <a:endParaRPr lang="en-US" dirty="0" smtClean="0"/>
           </a:p>
           <a:p>
             <a:pPr fontAlgn="base"/>
@@ -7092,11 +7114,7 @@
           <a:p>
             <a:r>
               <a:rPr lang="en-US" dirty="0" smtClean="0"/>
-              <a:t>What is PostgreSQL - In </a:t>
-            </a:r>
-            <a:r>
-              <a:rPr lang="en-US" dirty="0" smtClean="0"/>
-              <a:t>The Beginning…</a:t>
+              <a:t>What is PostgreSQL - In The Beginning…</a:t>
             </a:r>
             <a:br>
               <a:rPr lang="en-US" dirty="0" smtClean="0"/>
@@ -7155,7 +7173,6 @@
               <a:rPr lang="en-US" dirty="0" smtClean="0"/>
               <a:t>.</a:t>
             </a:r>
-            <a:endParaRPr lang="en-US" dirty="0" smtClean="0"/>
           </a:p>
         </p:txBody>
       </p:sp>
@@ -7211,15 +7228,7 @@
           <a:p>
             <a:r>
               <a:rPr lang="en-US" dirty="0" smtClean="0"/>
-              <a:t>Some </a:t>
-            </a:r>
-            <a:r>
-              <a:rPr lang="en-US" dirty="0" smtClean="0"/>
-              <a:t>Background and History</a:t>
-            </a:r>
-            <a:r>
-              <a:rPr lang="en-US" dirty="0" smtClean="0"/>
-              <a:t/>
+              <a:t>Some Background and History</a:t>
             </a:r>
             <a:br>
               <a:rPr lang="en-US" dirty="0" smtClean="0"/>
@@ -7494,10 +7503,6 @@
               <a:rPr lang="en-US" dirty="0" smtClean="0"/>
               <a:t>Development Cycle for the open source team</a:t>
             </a:r>
-            <a:r>
-              <a:rPr lang="en-US" dirty="0" smtClean="0"/>
-              <a:t/>
-            </a:r>
             <a:br>
               <a:rPr lang="en-US" dirty="0" smtClean="0"/>
             </a:br>
@@ -7641,10 +7646,6 @@
             <a:r>
               <a:rPr lang="en-US" dirty="0" smtClean="0"/>
               <a:t> - History</a:t>
-            </a:r>
-            <a:r>
-              <a:rPr lang="en-US" dirty="0" smtClean="0"/>
-              <a:t/>
             </a:r>
             <a:br>
               <a:rPr lang="en-US" dirty="0" smtClean="0"/>
@@ -8342,15 +8343,7 @@
           <a:p>
             <a:r>
               <a:rPr lang="en-US" dirty="0" smtClean="0"/>
-              <a:t>Day 1 </a:t>
-            </a:r>
-            <a:r>
-              <a:rPr lang="en-US" dirty="0" smtClean="0"/>
-              <a:t>Overview – Our New Schedule</a:t>
-            </a:r>
-            <a:r>
-              <a:rPr lang="en-US" dirty="0" smtClean="0"/>
-              <a:t/>
+              <a:t>Day 1 Overview – Our New Schedule</a:t>
             </a:r>
             <a:br>
               <a:rPr lang="en-US" dirty="0" smtClean="0"/>
@@ -8589,10 +8582,6 @@
               <a:rPr lang="en-US" dirty="0" smtClean="0"/>
               <a:t>Appendix</a:t>
             </a:r>
-            <a:r>
-              <a:rPr lang="en-US" dirty="0" smtClean="0"/>
-              <a:t/>
-            </a:r>
             <a:br>
               <a:rPr lang="en-US" dirty="0" smtClean="0"/>
             </a:br>
@@ -9742,15 +9731,7 @@
           <a:p>
             <a:r>
               <a:rPr lang="en-US" dirty="0" smtClean="0"/>
-              <a:t>Day 1 </a:t>
-            </a:r>
-            <a:r>
-              <a:rPr lang="en-US" dirty="0" smtClean="0"/>
-              <a:t>Overview – Our Original Schedule</a:t>
-            </a:r>
-            <a:r>
-              <a:rPr lang="en-US" dirty="0" smtClean="0"/>
-              <a:t/>
+              <a:t>Day 1 Overview – Our Original Schedule</a:t>
             </a:r>
             <a:br>
               <a:rPr lang="en-US" dirty="0" smtClean="0"/>
@@ -11894,15 +11875,7 @@
           <a:p>
             <a:r>
               <a:rPr lang="en-US" dirty="0" smtClean="0"/>
-              <a:t>Day 1 </a:t>
-            </a:r>
-            <a:r>
-              <a:rPr lang="en-US" dirty="0" smtClean="0"/>
-              <a:t>Overview – Our New Schedule</a:t>
-            </a:r>
-            <a:r>
-              <a:rPr lang="en-US" dirty="0" smtClean="0"/>
-              <a:t/>
+              <a:t>Day 1 Overview – Our New Schedule</a:t>
             </a:r>
             <a:br>
               <a:rPr lang="en-US" dirty="0" smtClean="0"/>

</xml_diff>